<commit_message>
Added Week-4 & updated Week-3 PPT
</commit_message>
<xml_diff>
--- a/Week 3/Week 3 - PPT.pptx
+++ b/Week 3/Week 3 - PPT.pptx
@@ -16,12 +16,12 @@
   <p:notesSz cx="6858000" cy="9144000"/>
   <p:embeddedFontLst>
     <p:embeddedFont>
-      <p:font typeface="Inconsolata" panose="020B0604020202020204" charset="0"/>
+      <p:font typeface="Nanum Gothic Coding" panose="020B0604020202020204" charset="-127"/>
       <p:regular r:id="rId6"/>
       <p:bold r:id="rId7"/>
     </p:embeddedFont>
     <p:embeddedFont>
-      <p:font typeface="Nanum Gothic Coding" panose="020B0604020202020204" charset="-127"/>
+      <p:font typeface="Inconsolata" panose="020B0604020202020204" charset="0"/>
       <p:regular r:id="rId8"/>
       <p:bold r:id="rId9"/>
     </p:embeddedFont>
@@ -10008,7 +10008,7 @@
                 <a:hlinkClick r:id="rId2">
                   <a:extLst>
                     <a:ext uri="{A12FA001-AC4F-418D-AE19-62706E023703}">
-                      <ahyp:hlinkClr xmlns:ahyp="http://schemas.microsoft.com/office/drawing/2018/hyperlinkcolor" xmlns:p15="http://schemas.microsoft.com/office/powerpoint/2012/main" xmlns:p14="http://schemas.microsoft.com/office/powerpoint/2010/main" xmlns:com="http://schemas.openxmlformats.org/drawingml/2006/compatibility" xmlns:pvml="urn:schemas-microsoft-com:office:powerpoint" xmlns:v="urn:schemas-microsoft-com:vml" xmlns:o="urn:schemas-microsoft-com:office:office" xmlns:dgm="http://schemas.openxmlformats.org/drawingml/2006/diagram" xmlns:c="http://schemas.openxmlformats.org/drawingml/2006/chart" xmlns:mv="urn:schemas-microsoft-com:mac:vml" xmlns:mc="http://schemas.openxmlformats.org/markup-compatibility/2006" xmlns="" val="tx"/>
+                      <ahyp:hlinkClr xmlns="" xmlns:mc="http://schemas.openxmlformats.org/markup-compatibility/2006" xmlns:mv="urn:schemas-microsoft-com:mac:vml" xmlns:c="http://schemas.openxmlformats.org/drawingml/2006/chart" xmlns:dgm="http://schemas.openxmlformats.org/drawingml/2006/diagram" xmlns:o="urn:schemas-microsoft-com:office:office" xmlns:v="urn:schemas-microsoft-com:vml" xmlns:pvml="urn:schemas-microsoft-com:office:powerpoint" xmlns:com="http://schemas.openxmlformats.org/drawingml/2006/compatibility" xmlns:p14="http://schemas.microsoft.com/office/powerpoint/2010/main" xmlns:p15="http://schemas.microsoft.com/office/powerpoint/2012/main" xmlns:ahyp="http://schemas.microsoft.com/office/drawing/2018/hyperlinkcolor" val="tx"/>
                     </a:ext>
                   </a:extLst>
                 </a:hlinkClick>
@@ -10042,7 +10042,7 @@
                 <a:hlinkClick r:id="rId3">
                   <a:extLst>
                     <a:ext uri="{A12FA001-AC4F-418D-AE19-62706E023703}">
-                      <ahyp:hlinkClr xmlns:ahyp="http://schemas.microsoft.com/office/drawing/2018/hyperlinkcolor" xmlns:p15="http://schemas.microsoft.com/office/powerpoint/2012/main" xmlns:p14="http://schemas.microsoft.com/office/powerpoint/2010/main" xmlns:com="http://schemas.openxmlformats.org/drawingml/2006/compatibility" xmlns:pvml="urn:schemas-microsoft-com:office:powerpoint" xmlns:v="urn:schemas-microsoft-com:vml" xmlns:o="urn:schemas-microsoft-com:office:office" xmlns:dgm="http://schemas.openxmlformats.org/drawingml/2006/diagram" xmlns:c="http://schemas.openxmlformats.org/drawingml/2006/chart" xmlns:mv="urn:schemas-microsoft-com:mac:vml" xmlns:mc="http://schemas.openxmlformats.org/markup-compatibility/2006" xmlns="" val="tx"/>
+                      <ahyp:hlinkClr xmlns="" xmlns:mc="http://schemas.openxmlformats.org/markup-compatibility/2006" xmlns:mv="urn:schemas-microsoft-com:mac:vml" xmlns:c="http://schemas.openxmlformats.org/drawingml/2006/chart" xmlns:dgm="http://schemas.openxmlformats.org/drawingml/2006/diagram" xmlns:o="urn:schemas-microsoft-com:office:office" xmlns:v="urn:schemas-microsoft-com:vml" xmlns:pvml="urn:schemas-microsoft-com:office:powerpoint" xmlns:com="http://schemas.openxmlformats.org/drawingml/2006/compatibility" xmlns:p14="http://schemas.microsoft.com/office/powerpoint/2010/main" xmlns:p15="http://schemas.microsoft.com/office/powerpoint/2012/main" xmlns:ahyp="http://schemas.microsoft.com/office/drawing/2018/hyperlinkcolor" val="tx"/>
                     </a:ext>
                   </a:extLst>
                 </a:hlinkClick>
@@ -10076,7 +10076,7 @@
                 <a:hlinkClick r:id="rId4">
                   <a:extLst>
                     <a:ext uri="{A12FA001-AC4F-418D-AE19-62706E023703}">
-                      <ahyp:hlinkClr xmlns:ahyp="http://schemas.microsoft.com/office/drawing/2018/hyperlinkcolor" xmlns:p15="http://schemas.microsoft.com/office/powerpoint/2012/main" xmlns:p14="http://schemas.microsoft.com/office/powerpoint/2010/main" xmlns:com="http://schemas.openxmlformats.org/drawingml/2006/compatibility" xmlns:pvml="urn:schemas-microsoft-com:office:powerpoint" xmlns:v="urn:schemas-microsoft-com:vml" xmlns:o="urn:schemas-microsoft-com:office:office" xmlns:dgm="http://schemas.openxmlformats.org/drawingml/2006/diagram" xmlns:c="http://schemas.openxmlformats.org/drawingml/2006/chart" xmlns:mv="urn:schemas-microsoft-com:mac:vml" xmlns:mc="http://schemas.openxmlformats.org/markup-compatibility/2006" xmlns="" val="tx"/>
+                      <ahyp:hlinkClr xmlns="" xmlns:mc="http://schemas.openxmlformats.org/markup-compatibility/2006" xmlns:mv="urn:schemas-microsoft-com:mac:vml" xmlns:c="http://schemas.openxmlformats.org/drawingml/2006/chart" xmlns:dgm="http://schemas.openxmlformats.org/drawingml/2006/diagram" xmlns:o="urn:schemas-microsoft-com:office:office" xmlns:v="urn:schemas-microsoft-com:vml" xmlns:pvml="urn:schemas-microsoft-com:office:powerpoint" xmlns:com="http://schemas.openxmlformats.org/drawingml/2006/compatibility" xmlns:p14="http://schemas.microsoft.com/office/powerpoint/2010/main" xmlns:p15="http://schemas.microsoft.com/office/powerpoint/2012/main" xmlns:ahyp="http://schemas.microsoft.com/office/drawing/2018/hyperlinkcolor" val="tx"/>
                     </a:ext>
                   </a:extLst>
                 </a:hlinkClick>
@@ -28459,7 +28459,7 @@
                 </a:solidFill>
                 <a:latin typeface="Nanum Gothic Coding"/>
               </a:rPr>
-              <a:t>WEEK-2</a:t>
+              <a:t>WEEK-3</a:t>
             </a:r>
             <a:endParaRPr b="1" i="0" dirty="0">
               <a:ln>

</xml_diff>